<commit_message>
Adding info to ppt
</commit_message>
<xml_diff>
--- a/ppt/Section+Introduction (3).pptx
+++ b/ppt/Section+Introduction (3).pptx
@@ -211,7 +211,7 @@
           <a:effectLst/>
           <a:extLst>
             <a:ext uri="{91240B29-F687-4f45-9708-019B960494DF}">
-              <a14:hiddenLine xmlns:a14="http://schemas.microsoft.com/office/drawing/2010/main" xmlns="" w="9525">
+              <a14:hiddenLine xmlns="" xmlns:a14="http://schemas.microsoft.com/office/drawing/2010/main" w="9525">
                 <a:solidFill>
                   <a:srgbClr val="000000"/>
                 </a:solidFill>
@@ -404,7 +404,7 @@
             <a:fld id="{08B9EBBA-996F-894A-B54A-D6246ED52CEA}" type="datetimeFigureOut">
               <a:rPr lang="en-US" dirty="0"/>
               <a:pPr/>
-              <a:t>9/8/2018</a:t>
+              <a:t>8/1/2020</a:t>
             </a:fld>
             <a:endParaRPr lang="en-US" dirty="0"/>
           </a:p>
@@ -719,7 +719,7 @@
             <a:fld id="{18C79C5D-2A6F-F04D-97DA-BEF2467B64E4}" type="datetimeFigureOut">
               <a:rPr lang="en-US" dirty="0"/>
               <a:pPr/>
-              <a:t>9/8/2018</a:t>
+              <a:t>8/1/2020</a:t>
             </a:fld>
             <a:endParaRPr lang="en-US" dirty="0"/>
           </a:p>
@@ -1204,7 +1204,7 @@
             <a:fld id="{8DFA1846-DA80-1C48-A609-854EA85C59AD}" type="datetimeFigureOut">
               <a:rPr lang="en-US" dirty="0"/>
               <a:pPr/>
-              <a:t>9/8/2018</a:t>
+              <a:t>8/1/2020</a:t>
             </a:fld>
             <a:endParaRPr lang="en-US" dirty="0"/>
           </a:p>
@@ -1570,7 +1570,7 @@
             <a:fld id="{FBF54567-0DE4-3F47-BF90-CB84690072F9}" type="datetimeFigureOut">
               <a:rPr lang="en-US" dirty="0"/>
               <a:pPr/>
-              <a:t>9/8/2018</a:t>
+              <a:t>8/1/2020</a:t>
             </a:fld>
             <a:endParaRPr lang="en-US" dirty="0"/>
           </a:p>
@@ -1721,7 +1721,7 @@
           <a:ln/>
           <a:extLst>
             <a:ext uri="{91240B29-F687-4f45-9708-019B960494DF}">
-              <a14:hiddenLine xmlns:a14="http://schemas.microsoft.com/office/drawing/2010/main" xmlns="" w="9525">
+              <a14:hiddenLine xmlns="" xmlns:a14="http://schemas.microsoft.com/office/drawing/2010/main" w="9525">
                 <a:solidFill>
                   <a:srgbClr val="000000"/>
                 </a:solidFill>
@@ -1840,7 +1840,7 @@
             <a:fld id="{C6C52C72-DE31-F449-A4ED-4C594FD91407}" type="datetimeFigureOut">
               <a:rPr lang="en-US" dirty="0"/>
               <a:pPr/>
-              <a:t>9/8/2018</a:t>
+              <a:t>8/1/2020</a:t>
             </a:fld>
             <a:endParaRPr lang="en-US" dirty="0"/>
           </a:p>
@@ -1993,7 +1993,7 @@
           <a:ln/>
           <a:extLst>
             <a:ext uri="{91240B29-F687-4f45-9708-019B960494DF}">
-              <a14:hiddenLine xmlns:a14="http://schemas.microsoft.com/office/drawing/2010/main" xmlns="" w="9525">
+              <a14:hiddenLine xmlns="" xmlns:a14="http://schemas.microsoft.com/office/drawing/2010/main" w="9525">
                 <a:solidFill>
                   <a:srgbClr val="000000"/>
                 </a:solidFill>
@@ -2122,7 +2122,7 @@
             <a:fld id="{ED62726E-379B-B349-9EED-81ED093FA806}" type="datetimeFigureOut">
               <a:rPr lang="en-US" dirty="0"/>
               <a:pPr/>
-              <a:t>9/8/2018</a:t>
+              <a:t>8/1/2020</a:t>
             </a:fld>
             <a:endParaRPr lang="en-US" dirty="0"/>
           </a:p>
@@ -2273,7 +2273,7 @@
           <a:ln/>
           <a:extLst>
             <a:ext uri="{91240B29-F687-4f45-9708-019B960494DF}">
-              <a14:hiddenLine xmlns:a14="http://schemas.microsoft.com/office/drawing/2010/main" xmlns="" w="9525">
+              <a14:hiddenLine xmlns="" xmlns:a14="http://schemas.microsoft.com/office/drawing/2010/main" w="9525">
                 <a:solidFill>
                   <a:srgbClr val="000000"/>
                 </a:solidFill>
@@ -2402,7 +2402,7 @@
             <a:fld id="{9B3A1323-8D79-1946-B0D7-40001CF92E9D}" type="datetimeFigureOut">
               <a:rPr lang="en-US" dirty="0"/>
               <a:pPr/>
-              <a:t>9/8/2018</a:t>
+              <a:t>8/1/2020</a:t>
             </a:fld>
             <a:endParaRPr lang="en-US" dirty="0"/>
           </a:p>
@@ -2742,7 +2742,7 @@
             <a:fld id="{8DFA1846-DA80-1C48-A609-854EA85C59AD}" type="datetimeFigureOut">
               <a:rPr lang="en-US" dirty="0"/>
               <a:pPr/>
-              <a:t>9/8/2018</a:t>
+              <a:t>8/1/2020</a:t>
             </a:fld>
             <a:endParaRPr lang="en-US" dirty="0"/>
           </a:p>
@@ -2893,7 +2893,7 @@
           <a:ln/>
           <a:extLst>
             <a:ext uri="{91240B29-F687-4f45-9708-019B960494DF}">
-              <a14:hiddenLine xmlns:a14="http://schemas.microsoft.com/office/drawing/2010/main" xmlns="" w="9525">
+              <a14:hiddenLine xmlns="" xmlns:a14="http://schemas.microsoft.com/office/drawing/2010/main" w="9525">
                 <a:solidFill>
                   <a:srgbClr val="000000"/>
                 </a:solidFill>
@@ -3078,7 +3078,7 @@
             <a:fld id="{57302355-E14B-8545-A8F8-0FE83CC9D524}" type="datetimeFigureOut">
               <a:rPr lang="en-US" dirty="0"/>
               <a:pPr/>
-              <a:t>9/8/2018</a:t>
+              <a:t>8/1/2020</a:t>
             </a:fld>
             <a:endParaRPr lang="en-US" dirty="0"/>
           </a:p>
@@ -3229,7 +3229,7 @@
           <a:ln/>
           <a:extLst>
             <a:ext uri="{91240B29-F687-4f45-9708-019B960494DF}">
-              <a14:hiddenLine xmlns:a14="http://schemas.microsoft.com/office/drawing/2010/main" xmlns="" w="9525">
+              <a14:hiddenLine xmlns="" xmlns:a14="http://schemas.microsoft.com/office/drawing/2010/main" w="9525">
                 <a:solidFill>
                   <a:srgbClr val="000000"/>
                 </a:solidFill>
@@ -3552,7 +3552,7 @@
             <a:fld id="{02640F58-564D-2B4F-AE67-E407BA4FCF45}" type="datetimeFigureOut">
               <a:rPr lang="en-US" dirty="0"/>
               <a:pPr/>
-              <a:t>9/8/2018</a:t>
+              <a:t>8/1/2020</a:t>
             </a:fld>
             <a:endParaRPr lang="en-US" dirty="0"/>
           </a:p>
@@ -3703,7 +3703,7 @@
           <a:ln/>
           <a:extLst>
             <a:ext uri="{91240B29-F687-4f45-9708-019B960494DF}">
-              <a14:hiddenLine xmlns:a14="http://schemas.microsoft.com/office/drawing/2010/main" xmlns="" w="9525">
+              <a14:hiddenLine xmlns="" xmlns:a14="http://schemas.microsoft.com/office/drawing/2010/main" w="9525">
                 <a:solidFill>
                   <a:srgbClr val="000000"/>
                 </a:solidFill>
@@ -3770,7 +3770,7 @@
             <a:fld id="{F13A34C8-038E-2045-AF43-DF7DBB8E0E9E}" type="datetimeFigureOut">
               <a:rPr lang="en-US" dirty="0"/>
               <a:pPr/>
-              <a:t>9/8/2018</a:t>
+              <a:t>8/1/2020</a:t>
             </a:fld>
             <a:endParaRPr lang="en-US" dirty="0"/>
           </a:p>
@@ -3862,7 +3862,7 @@
             <a:fld id="{8818C68F-D26B-8F47-958C-23B49CF8A634}" type="datetimeFigureOut">
               <a:rPr lang="en-US" dirty="0"/>
               <a:pPr/>
-              <a:t>9/8/2018</a:t>
+              <a:t>8/1/2020</a:t>
             </a:fld>
             <a:endParaRPr lang="en-US" dirty="0"/>
           </a:p>
@@ -4126,7 +4126,7 @@
           <a:ln/>
           <a:extLst>
             <a:ext uri="{91240B29-F687-4f45-9708-019B960494DF}">
-              <a14:hiddenLine xmlns:a14="http://schemas.microsoft.com/office/drawing/2010/main" xmlns="" w="9525">
+              <a14:hiddenLine xmlns="" xmlns:a14="http://schemas.microsoft.com/office/drawing/2010/main" w="9525">
                 <a:solidFill>
                   <a:srgbClr val="000000"/>
                 </a:solidFill>
@@ -4326,7 +4326,7 @@
             <a:fld id="{D0DF5E60-9974-AC48-9591-99C2BB44B7CF}" type="datetimeFigureOut">
               <a:rPr lang="en-US" dirty="0"/>
               <a:pPr/>
-              <a:t>9/8/2018</a:t>
+              <a:t>8/1/2020</a:t>
             </a:fld>
             <a:endParaRPr lang="en-US" dirty="0"/>
           </a:p>
@@ -4636,7 +4636,7 @@
             <a:fld id="{18C79C5D-2A6F-F04D-97DA-BEF2467B64E4}" type="datetimeFigureOut">
               <a:rPr lang="en-US" dirty="0"/>
               <a:pPr/>
-              <a:t>9/8/2018</a:t>
+              <a:t>8/1/2020</a:t>
             </a:fld>
             <a:endParaRPr lang="en-US" dirty="0"/>
           </a:p>
@@ -4903,7 +4903,7 @@
             <a:fld id="{09B482E8-6E0E-1B4F-B1FD-C69DB9E858D9}" type="datetimeFigureOut">
               <a:rPr lang="en-US" dirty="0"/>
               <a:pPr/>
-              <a:t>9/8/2018</a:t>
+              <a:t>8/1/2020</a:t>
             </a:fld>
             <a:endParaRPr lang="en-US" dirty="0"/>
           </a:p>
@@ -5387,7 +5387,19 @@
           <a:bodyPr/>
           <a:lstStyle/>
           <a:p>
-            <a:endParaRPr lang="en-GB"/>
+            <a:r>
+              <a:rPr lang="en-GB" dirty="0" smtClean="0"/>
+              <a:t>Anuranjan Srivastava(</a:t>
+            </a:r>
+            <a:r>
+              <a:rPr lang="en-GB" dirty="0" err="1" smtClean="0"/>
+              <a:t>codersaty</a:t>
+            </a:r>
+            <a:r>
+              <a:rPr lang="en-GB" dirty="0" smtClean="0"/>
+              <a:t>)</a:t>
+            </a:r>
+            <a:endParaRPr lang="en-GB" dirty="0"/>
           </a:p>
         </p:txBody>
       </p:sp>
@@ -5489,11 +5501,7 @@
           <a:p>
             <a:r>
               <a:rPr lang="en-US" dirty="0" smtClean="0"/>
-              <a:t>In this section, </a:t>
-            </a:r>
-            <a:r>
-              <a:rPr lang="en-US" dirty="0" smtClean="0"/>
-              <a:t>we will look at using all of the skills we learned in a </a:t>
+              <a:t>In this section, we will look at using all of the skills we learned in a </a:t>
             </a:r>
             <a:r>
               <a:rPr lang="en-US" dirty="0" err="1" smtClean="0"/>
@@ -5679,11 +5687,7 @@
           <a:p>
             <a:r>
               <a:rPr lang="en-US" dirty="0" smtClean="0"/>
-              <a:t>We will </a:t>
-            </a:r>
-            <a:r>
-              <a:rPr lang="en-US" dirty="0" smtClean="0"/>
-              <a:t>first look at </a:t>
+              <a:t>We will first look at </a:t>
             </a:r>
             <a:r>
               <a:rPr lang="en-US" dirty="0" err="1" smtClean="0"/>
@@ -5711,11 +5715,7 @@
           <a:p>
             <a:r>
               <a:rPr lang="en-US" dirty="0" smtClean="0"/>
-              <a:t>We </a:t>
-            </a:r>
-            <a:r>
-              <a:rPr lang="en-US" dirty="0" smtClean="0"/>
-              <a:t>will also look at some of the differences between a terminal and a GUI in terms of using </a:t>
+              <a:t>We will also look at some of the differences between a terminal and a GUI in terms of using </a:t>
             </a:r>
             <a:r>
               <a:rPr lang="en-US" dirty="0" err="1" smtClean="0"/>
@@ -5725,7 +5725,6 @@
               <a:rPr lang="en-US" dirty="0" smtClean="0"/>
               <a:t>.</a:t>
             </a:r>
-            <a:endParaRPr lang="en-US" dirty="0" smtClean="0"/>
           </a:p>
           <a:p>
             <a:endParaRPr lang="en-US" dirty="0" smtClean="0"/>
@@ -5878,27 +5877,19 @@
           <a:p>
             <a:r>
               <a:rPr lang="en-US" dirty="0" smtClean="0"/>
-              <a:t>We will then </a:t>
-            </a:r>
+              <a:t>We will then start to look at using remote features, such as push and pull.</a:t>
+            </a:r>
+          </a:p>
+          <a:p>
+            <a:pPr marL="0" indent="0">
+              <a:buNone/>
+            </a:pPr>
+            <a:endParaRPr lang="en-US" dirty="0"/>
+          </a:p>
+          <a:p>
             <a:r>
               <a:rPr lang="en-US" dirty="0" smtClean="0"/>
-              <a:t>start to look at using remote features, such as push and pull.</a:t>
-            </a:r>
-          </a:p>
-          <a:p>
-            <a:pPr marL="0" indent="0">
-              <a:buNone/>
-            </a:pPr>
-            <a:endParaRPr lang="en-US" dirty="0"/>
-          </a:p>
-          <a:p>
-            <a:r>
-              <a:rPr lang="en-US" dirty="0" smtClean="0"/>
-              <a:t>We will </a:t>
-            </a:r>
-            <a:r>
-              <a:rPr lang="en-US" dirty="0" smtClean="0"/>
-              <a:t>use these features to bring </a:t>
+              <a:t>We will use these features to bring </a:t>
             </a:r>
             <a:r>
               <a:rPr lang="en-US" dirty="0" err="1" smtClean="0"/>
@@ -6060,10 +6051,26 @@
         </p:nvSpPr>
         <p:spPr/>
         <p:txBody>
-          <a:bodyPr/>
-          <a:lstStyle/>
-          <a:p>
-            <a:endParaRPr lang="en-GB"/>
+          <a:bodyPr>
+            <a:normAutofit lnSpcReduction="10000"/>
+          </a:bodyPr>
+          <a:lstStyle/>
+          <a:p>
+            <a:r>
+              <a:rPr lang="en-GB" dirty="0"/>
+              <a:t>Anuranjan Srivastava(</a:t>
+            </a:r>
+            <a:r>
+              <a:rPr lang="en-GB" dirty="0" err="1"/>
+              <a:t>codersaty</a:t>
+            </a:r>
+            <a:r>
+              <a:rPr lang="en-GB" dirty="0"/>
+              <a:t>)</a:t>
+            </a:r>
+          </a:p>
+          <a:p>
+            <a:endParaRPr lang="en-GB" dirty="0"/>
           </a:p>
         </p:txBody>
       </p:sp>

</xml_diff>